<commit_message>
added exercises to slides
</commit_message>
<xml_diff>
--- a/presentations/unit_1_introduction.pptx
+++ b/presentations/unit_1_introduction.pptx
@@ -113,6 +113,11 @@
       </a:defRPr>
     </a:lvl9pPr>
   </p:defaultTextStyle>
+  <p:extLst>
+    <p:ext uri="{EFAFB233-063F-42B5-8137-9DF3F51BA10A}">
+      <p15:sldGuideLst xmlns:p15="http://schemas.microsoft.com/office/powerpoint/2012/main"/>
+    </p:ext>
+  </p:extLst>
 </p:presentation>
 </file>
 
@@ -211,7 +216,7 @@
           <a:effectLst/>
           <a:extLst>
             <a:ext uri="{91240B29-F687-4f45-9708-019B960494DF}">
-              <a14:hiddenLine xmlns:a14="http://schemas.microsoft.com/office/drawing/2010/main" xmlns="" w="9525">
+              <a14:hiddenLine xmlns="" xmlns:a14="http://schemas.microsoft.com/office/drawing/2010/main" w="9525">
                 <a:solidFill>
                   <a:srgbClr val="000000"/>
                 </a:solidFill>
@@ -1721,7 +1726,7 @@
           <a:ln/>
           <a:extLst>
             <a:ext uri="{91240B29-F687-4f45-9708-019B960494DF}">
-              <a14:hiddenLine xmlns:a14="http://schemas.microsoft.com/office/drawing/2010/main" xmlns="" w="9525">
+              <a14:hiddenLine xmlns="" xmlns:a14="http://schemas.microsoft.com/office/drawing/2010/main" w="9525">
                 <a:solidFill>
                   <a:srgbClr val="000000"/>
                 </a:solidFill>
@@ -1993,7 +1998,7 @@
           <a:ln/>
           <a:extLst>
             <a:ext uri="{91240B29-F687-4f45-9708-019B960494DF}">
-              <a14:hiddenLine xmlns:a14="http://schemas.microsoft.com/office/drawing/2010/main" xmlns="" w="9525">
+              <a14:hiddenLine xmlns="" xmlns:a14="http://schemas.microsoft.com/office/drawing/2010/main" w="9525">
                 <a:solidFill>
                   <a:srgbClr val="000000"/>
                 </a:solidFill>
@@ -2273,7 +2278,7 @@
           <a:ln/>
           <a:extLst>
             <a:ext uri="{91240B29-F687-4f45-9708-019B960494DF}">
-              <a14:hiddenLine xmlns:a14="http://schemas.microsoft.com/office/drawing/2010/main" xmlns="" w="9525">
+              <a14:hiddenLine xmlns="" xmlns:a14="http://schemas.microsoft.com/office/drawing/2010/main" w="9525">
                 <a:solidFill>
                   <a:srgbClr val="000000"/>
                 </a:solidFill>
@@ -2893,7 +2898,7 @@
           <a:ln/>
           <a:extLst>
             <a:ext uri="{91240B29-F687-4f45-9708-019B960494DF}">
-              <a14:hiddenLine xmlns:a14="http://schemas.microsoft.com/office/drawing/2010/main" xmlns="" w="9525">
+              <a14:hiddenLine xmlns="" xmlns:a14="http://schemas.microsoft.com/office/drawing/2010/main" w="9525">
                 <a:solidFill>
                   <a:srgbClr val="000000"/>
                 </a:solidFill>
@@ -3229,7 +3234,7 @@
           <a:ln/>
           <a:extLst>
             <a:ext uri="{91240B29-F687-4f45-9708-019B960494DF}">
-              <a14:hiddenLine xmlns:a14="http://schemas.microsoft.com/office/drawing/2010/main" xmlns="" w="9525">
+              <a14:hiddenLine xmlns="" xmlns:a14="http://schemas.microsoft.com/office/drawing/2010/main" w="9525">
                 <a:solidFill>
                   <a:srgbClr val="000000"/>
                 </a:solidFill>
@@ -3703,7 +3708,7 @@
           <a:ln/>
           <a:extLst>
             <a:ext uri="{91240B29-F687-4f45-9708-019B960494DF}">
-              <a14:hiddenLine xmlns:a14="http://schemas.microsoft.com/office/drawing/2010/main" xmlns="" w="9525">
+              <a14:hiddenLine xmlns="" xmlns:a14="http://schemas.microsoft.com/office/drawing/2010/main" w="9525">
                 <a:solidFill>
                   <a:srgbClr val="000000"/>
                 </a:solidFill>
@@ -4126,7 +4131,7 @@
           <a:ln/>
           <a:extLst>
             <a:ext uri="{91240B29-F687-4f45-9708-019B960494DF}">
-              <a14:hiddenLine xmlns:a14="http://schemas.microsoft.com/office/drawing/2010/main" xmlns="" w="9525">
+              <a14:hiddenLine xmlns="" xmlns:a14="http://schemas.microsoft.com/office/drawing/2010/main" w="9525">
                 <a:solidFill>
                   <a:srgbClr val="000000"/>
                 </a:solidFill>

</xml_diff>